<commit_message>
Plot of photosynthesis vs TNC/starch/sugars
Added the plot of photosynthesis vs TNC/starch/sugars from Gas exchange
measurements
</commit_message>
<xml_diff>
--- a/raw_data/Figure_1.pptx
+++ b/raw_data/Figure_1.pptx
@@ -214,7 +214,7 @@
           <a:p>
             <a:fld id="{DC23AF62-04DA-F745-A8B9-E35E5BE7FD13}" type="datetimeFigureOut">
               <a:rPr lang="en-US" smtClean="0"/>
-              <a:t>9/19/17</a:t>
+              <a:t>2/2/18</a:t>
             </a:fld>
             <a:endParaRPr lang="en-US"/>
           </a:p>
@@ -379,7 +379,7 @@
           <a:p>
             <a:fld id="{22A196E9-23DA-40C8-8729-A416F64D3FDA}" type="datetimeFigureOut">
               <a:rPr lang="en-AU" smtClean="0"/>
-              <a:t>19/09/2017</a:t>
+              <a:t>2/02/2018</a:t>
             </a:fld>
             <a:endParaRPr lang="en-AU"/>
           </a:p>
@@ -921,7 +921,7 @@
           <a:p>
             <a:fld id="{747BD9CF-C612-43A8-B934-5CF47C06606C}" type="datetimeFigureOut">
               <a:rPr lang="en-AU" smtClean="0"/>
-              <a:t>19/09/2017</a:t>
+              <a:t>2/02/2018</a:t>
             </a:fld>
             <a:endParaRPr lang="en-AU"/>
           </a:p>
@@ -1091,7 +1091,7 @@
           <a:p>
             <a:fld id="{747BD9CF-C612-43A8-B934-5CF47C06606C}" type="datetimeFigureOut">
               <a:rPr lang="en-AU" smtClean="0"/>
-              <a:t>19/09/2017</a:t>
+              <a:t>2/02/2018</a:t>
             </a:fld>
             <a:endParaRPr lang="en-AU"/>
           </a:p>
@@ -1271,7 +1271,7 @@
           <a:p>
             <a:fld id="{747BD9CF-C612-43A8-B934-5CF47C06606C}" type="datetimeFigureOut">
               <a:rPr lang="en-AU" smtClean="0"/>
-              <a:t>19/09/2017</a:t>
+              <a:t>2/02/2018</a:t>
             </a:fld>
             <a:endParaRPr lang="en-AU"/>
           </a:p>
@@ -1441,7 +1441,7 @@
           <a:p>
             <a:fld id="{747BD9CF-C612-43A8-B934-5CF47C06606C}" type="datetimeFigureOut">
               <a:rPr lang="en-AU" smtClean="0"/>
-              <a:t>19/09/2017</a:t>
+              <a:t>2/02/2018</a:t>
             </a:fld>
             <a:endParaRPr lang="en-AU"/>
           </a:p>
@@ -1687,7 +1687,7 @@
           <a:p>
             <a:fld id="{747BD9CF-C612-43A8-B934-5CF47C06606C}" type="datetimeFigureOut">
               <a:rPr lang="en-AU" smtClean="0"/>
-              <a:t>19/09/2017</a:t>
+              <a:t>2/02/2018</a:t>
             </a:fld>
             <a:endParaRPr lang="en-AU"/>
           </a:p>
@@ -1975,7 +1975,7 @@
           <a:p>
             <a:fld id="{747BD9CF-C612-43A8-B934-5CF47C06606C}" type="datetimeFigureOut">
               <a:rPr lang="en-AU" smtClean="0"/>
-              <a:t>19/09/2017</a:t>
+              <a:t>2/02/2018</a:t>
             </a:fld>
             <a:endParaRPr lang="en-AU"/>
           </a:p>
@@ -2397,7 +2397,7 @@
           <a:p>
             <a:fld id="{747BD9CF-C612-43A8-B934-5CF47C06606C}" type="datetimeFigureOut">
               <a:rPr lang="en-AU" smtClean="0"/>
-              <a:t>19/09/2017</a:t>
+              <a:t>2/02/2018</a:t>
             </a:fld>
             <a:endParaRPr lang="en-AU"/>
           </a:p>
@@ -2515,7 +2515,7 @@
           <a:p>
             <a:fld id="{747BD9CF-C612-43A8-B934-5CF47C06606C}" type="datetimeFigureOut">
               <a:rPr lang="en-AU" smtClean="0"/>
-              <a:t>19/09/2017</a:t>
+              <a:t>2/02/2018</a:t>
             </a:fld>
             <a:endParaRPr lang="en-AU"/>
           </a:p>
@@ -2610,7 +2610,7 @@
           <a:p>
             <a:fld id="{747BD9CF-C612-43A8-B934-5CF47C06606C}" type="datetimeFigureOut">
               <a:rPr lang="en-AU" smtClean="0"/>
-              <a:t>19/09/2017</a:t>
+              <a:t>2/02/2018</a:t>
             </a:fld>
             <a:endParaRPr lang="en-AU"/>
           </a:p>
@@ -2887,7 +2887,7 @@
           <a:p>
             <a:fld id="{747BD9CF-C612-43A8-B934-5CF47C06606C}" type="datetimeFigureOut">
               <a:rPr lang="en-AU" smtClean="0"/>
-              <a:t>19/09/2017</a:t>
+              <a:t>2/02/2018</a:t>
             </a:fld>
             <a:endParaRPr lang="en-AU"/>
           </a:p>
@@ -3140,7 +3140,7 @@
           <a:p>
             <a:fld id="{747BD9CF-C612-43A8-B934-5CF47C06606C}" type="datetimeFigureOut">
               <a:rPr lang="en-AU" smtClean="0"/>
-              <a:t>19/09/2017</a:t>
+              <a:t>2/02/2018</a:t>
             </a:fld>
             <a:endParaRPr lang="en-AU"/>
           </a:p>
@@ -3353,7 +3353,7 @@
           <a:p>
             <a:fld id="{747BD9CF-C612-43A8-B934-5CF47C06606C}" type="datetimeFigureOut">
               <a:rPr lang="en-AU" smtClean="0"/>
-              <a:t>19/09/2017</a:t>
+              <a:t>2/02/2018</a:t>
             </a:fld>
             <a:endParaRPr lang="en-AU"/>
           </a:p>
@@ -3741,6 +3741,12 @@
             <a:chOff x="2449958" y="1312907"/>
             <a:chExt cx="3124986" cy="2021396"/>
           </a:xfrm>
+          <a:noFill/>
+          <a:effectLst>
+            <a:outerShdw blurRad="50800" dist="50800" dir="5400000" algn="ctr" rotWithShape="0">
+              <a:schemeClr val="bg1"/>
+            </a:outerShdw>
+          </a:effectLst>
         </p:grpSpPr>
         <p:grpSp>
           <p:nvGrpSpPr>
@@ -3757,6 +3763,7 @@
               <a:chOff x="5268032" y="778358"/>
               <a:chExt cx="2972636" cy="2021396"/>
             </a:xfrm>
+            <a:grpFill/>
             <a:effectLst/>
           </p:grpSpPr>
           <p:grpSp>
@@ -3772,6 +3779,7 @@
                 <a:chOff x="5268032" y="778358"/>
                 <a:chExt cx="2972636" cy="2021396"/>
               </a:xfrm>
+              <a:grpFill/>
             </p:grpSpPr>
             <p:grpSp>
               <p:nvGrpSpPr>
@@ -3786,6 +3794,7 @@
                   <a:chOff x="5141859" y="1012547"/>
                   <a:chExt cx="4002141" cy="2609593"/>
                 </a:xfrm>
+                <a:grpFill/>
               </p:grpSpPr>
               <p:grpSp>
                 <p:nvGrpSpPr>
@@ -3800,6 +3809,7 @@
                     <a:chOff x="3995920" y="3723878"/>
                     <a:chExt cx="1778512" cy="557922"/>
                   </a:xfrm>
+                  <a:grpFill/>
                 </p:grpSpPr>
                 <p:sp>
                   <p:nvSpPr>
@@ -3815,12 +3825,19 @@
                     <a:prstGeom prst="rect">
                       <a:avLst/>
                     </a:prstGeom>
-                    <a:noFill/>
+                    <a:grpFill/>
                     <a:ln>
                       <a:solidFill>
                         <a:schemeClr val="tx1"/>
                       </a:solidFill>
                     </a:ln>
+                    <a:effectLst>
+                      <a:outerShdw blurRad="40000" dist="23000" dir="5400000" rotWithShape="0">
+                        <a:schemeClr val="bg1">
+                          <a:alpha val="35000"/>
+                        </a:schemeClr>
+                      </a:outerShdw>
+                    </a:effectLst>
                   </p:spPr>
                   <p:style>
                     <a:lnRef idx="1">
@@ -3876,12 +3893,20 @@
                     <a:prstGeom prst="straightConnector1">
                       <a:avLst/>
                     </a:prstGeom>
+                    <a:grpFill/>
                     <a:ln>
                       <a:solidFill>
                         <a:srgbClr val="000000"/>
                       </a:solidFill>
                       <a:tailEnd type="arrow"/>
                     </a:ln>
+                    <a:effectLst>
+                      <a:outerShdw blurRad="40000" dist="20000" dir="5400000" rotWithShape="0">
+                        <a:schemeClr val="bg1">
+                          <a:alpha val="38000"/>
+                        </a:schemeClr>
+                      </a:outerShdw>
+                    </a:effectLst>
                   </p:spPr>
                   <p:style>
                     <a:lnRef idx="2">
@@ -3912,10 +3937,17 @@
                     <a:prstGeom prst="rect">
                       <a:avLst/>
                     </a:prstGeom>
-                    <a:noFill/>
+                    <a:grpFill/>
                     <a:ln>
                       <a:noFill/>
                     </a:ln>
+                    <a:effectLst>
+                      <a:outerShdw blurRad="40000" dist="23000" dir="5400000" rotWithShape="0">
+                        <a:schemeClr val="bg1">
+                          <a:alpha val="35000"/>
+                        </a:schemeClr>
+                      </a:outerShdw>
+                    </a:effectLst>
                   </p:spPr>
                   <p:style>
                     <a:lnRef idx="1">
@@ -3966,14 +3998,19 @@
                     <a:prstGeom prst="flowChartCollate">
                       <a:avLst/>
                     </a:prstGeom>
-                    <a:solidFill>
-                      <a:srgbClr val="FFFFFF"/>
-                    </a:solidFill>
+                    <a:grpFill/>
                     <a:ln>
                       <a:solidFill>
                         <a:schemeClr val="tx1"/>
                       </a:solidFill>
                     </a:ln>
+                    <a:effectLst>
+                      <a:outerShdw blurRad="40000" dist="23000" dir="5400000" rotWithShape="0">
+                        <a:schemeClr val="bg1">
+                          <a:alpha val="35000"/>
+                        </a:schemeClr>
+                      </a:outerShdw>
+                    </a:effectLst>
                     <a:scene3d>
                       <a:camera prst="orthographicFront">
                         <a:rot lat="0" lon="21299999" rev="0"/>
@@ -4023,6 +4060,7 @@
                     <a:chOff x="1222136" y="1569122"/>
                     <a:chExt cx="911209" cy="884011"/>
                   </a:xfrm>
+                  <a:grpFill/>
                 </p:grpSpPr>
                 <p:cxnSp>
                   <p:nvCxnSpPr>
@@ -4038,12 +4076,20 @@
                     <a:prstGeom prst="straightConnector1">
                       <a:avLst/>
                     </a:prstGeom>
+                    <a:grpFill/>
                     <a:ln>
                       <a:solidFill>
                         <a:srgbClr val="000000"/>
                       </a:solidFill>
                       <a:tailEnd type="arrow"/>
                     </a:ln>
+                    <a:effectLst>
+                      <a:outerShdw blurRad="40000" dist="20000" dir="5400000" rotWithShape="0">
+                        <a:schemeClr val="bg1">
+                          <a:alpha val="38000"/>
+                        </a:schemeClr>
+                      </a:outerShdw>
+                    </a:effectLst>
                   </p:spPr>
                   <p:style>
                     <a:lnRef idx="2">
@@ -4074,10 +4120,17 @@
                     <a:prstGeom prst="rect">
                       <a:avLst/>
                     </a:prstGeom>
-                    <a:noFill/>
+                    <a:grpFill/>
                     <a:ln>
                       <a:noFill/>
                     </a:ln>
+                    <a:effectLst>
+                      <a:outerShdw blurRad="40000" dist="23000" dir="5400000" rotWithShape="0">
+                        <a:schemeClr val="bg1">
+                          <a:alpha val="35000"/>
+                        </a:schemeClr>
+                      </a:outerShdw>
+                    </a:effectLst>
                   </p:spPr>
                   <p:style>
                     <a:lnRef idx="1">
@@ -4136,14 +4189,19 @@
                     <a:prstGeom prst="flowChartCollate">
                       <a:avLst/>
                     </a:prstGeom>
-                    <a:solidFill>
-                      <a:srgbClr val="FFFFFF"/>
-                    </a:solidFill>
+                    <a:grpFill/>
                     <a:ln>
                       <a:solidFill>
                         <a:schemeClr val="tx1"/>
                       </a:solidFill>
                     </a:ln>
+                    <a:effectLst>
+                      <a:outerShdw blurRad="40000" dist="23000" dir="5400000" rotWithShape="0">
+                        <a:schemeClr val="bg1">
+                          <a:alpha val="35000"/>
+                        </a:schemeClr>
+                      </a:outerShdw>
+                    </a:effectLst>
                     <a:scene3d>
                       <a:camera prst="orthographicFront">
                         <a:rot lat="0" lon="21299999" rev="0"/>
@@ -4193,6 +4251,7 @@
                     <a:chOff x="6434543" y="1012547"/>
                     <a:chExt cx="2709457" cy="2609593"/>
                   </a:xfrm>
+                  <a:grpFill/>
                 </p:grpSpPr>
                 <p:grpSp>
                   <p:nvGrpSpPr>
@@ -4207,6 +4266,7 @@
                       <a:chOff x="1134996" y="1275606"/>
                       <a:chExt cx="2626774" cy="2339980"/>
                     </a:xfrm>
+                    <a:grpFill/>
                   </p:grpSpPr>
                   <p:sp>
                     <p:nvSpPr>
@@ -4222,12 +4282,19 @@
                       <a:prstGeom prst="rect">
                         <a:avLst/>
                       </a:prstGeom>
-                      <a:noFill/>
+                      <a:grpFill/>
                       <a:ln>
                         <a:solidFill>
                           <a:schemeClr val="tx1"/>
                         </a:solidFill>
                       </a:ln>
+                      <a:effectLst>
+                        <a:outerShdw blurRad="40000" dist="23000" dir="5400000" rotWithShape="0">
+                          <a:schemeClr val="bg1">
+                            <a:alpha val="35000"/>
+                          </a:schemeClr>
+                        </a:outerShdw>
+                      </a:effectLst>
                     </p:spPr>
                     <p:style>
                       <a:lnRef idx="1">
@@ -4286,12 +4353,19 @@
                       <a:prstGeom prst="rect">
                         <a:avLst/>
                       </a:prstGeom>
-                      <a:noFill/>
+                      <a:grpFill/>
                       <a:ln>
                         <a:solidFill>
                           <a:schemeClr val="tx1"/>
                         </a:solidFill>
                       </a:ln>
+                      <a:effectLst>
+                        <a:outerShdw blurRad="40000" dist="23000" dir="5400000" rotWithShape="0">
+                          <a:schemeClr val="bg1">
+                            <a:alpha val="35000"/>
+                          </a:schemeClr>
+                        </a:outerShdw>
+                      </a:effectLst>
                     </p:spPr>
                     <p:style>
                       <a:lnRef idx="1">
@@ -4350,12 +4424,19 @@
                       <a:prstGeom prst="rect">
                         <a:avLst/>
                       </a:prstGeom>
-                      <a:noFill/>
+                      <a:grpFill/>
                       <a:ln>
                         <a:solidFill>
                           <a:schemeClr val="tx1"/>
                         </a:solidFill>
                       </a:ln>
+                      <a:effectLst>
+                        <a:outerShdw blurRad="40000" dist="23000" dir="5400000" rotWithShape="0">
+                          <a:schemeClr val="bg1">
+                            <a:alpha val="35000"/>
+                          </a:schemeClr>
+                        </a:outerShdw>
+                      </a:effectLst>
                     </p:spPr>
                     <p:style>
                       <a:lnRef idx="1">
@@ -4416,12 +4497,20 @@
                       <a:prstGeom prst="bentConnector2">
                         <a:avLst/>
                       </a:prstGeom>
+                      <a:grpFill/>
                       <a:ln>
                         <a:solidFill>
                           <a:srgbClr val="000000"/>
                         </a:solidFill>
                         <a:tailEnd type="arrow"/>
                       </a:ln>
+                      <a:effectLst>
+                        <a:outerShdw blurRad="40000" dist="20000" dir="5400000" rotWithShape="0">
+                          <a:schemeClr val="bg1">
+                            <a:alpha val="38000"/>
+                          </a:schemeClr>
+                        </a:outerShdw>
+                      </a:effectLst>
                     </p:spPr>
                     <p:style>
                       <a:lnRef idx="2">
@@ -4454,12 +4543,20 @@
                       <a:prstGeom prst="bentConnector2">
                         <a:avLst/>
                       </a:prstGeom>
+                      <a:grpFill/>
                       <a:ln>
                         <a:solidFill>
                           <a:srgbClr val="000000"/>
                         </a:solidFill>
                         <a:tailEnd type="arrow"/>
                       </a:ln>
+                      <a:effectLst>
+                        <a:outerShdw blurRad="40000" dist="20000" dir="5400000" rotWithShape="0">
+                          <a:schemeClr val="bg1">
+                            <a:alpha val="38000"/>
+                          </a:schemeClr>
+                        </a:outerShdw>
+                      </a:effectLst>
                     </p:spPr>
                     <p:style>
                       <a:lnRef idx="2">
@@ -4490,14 +4587,19 @@
                       <a:prstGeom prst="flowChartCollate">
                         <a:avLst/>
                       </a:prstGeom>
-                      <a:solidFill>
-                        <a:srgbClr val="FFFFFF"/>
-                      </a:solidFill>
+                      <a:grpFill/>
                       <a:ln>
                         <a:solidFill>
                           <a:schemeClr val="tx1"/>
                         </a:solidFill>
                       </a:ln>
+                      <a:effectLst>
+                        <a:outerShdw blurRad="40000" dist="23000" dir="5400000" rotWithShape="0">
+                          <a:schemeClr val="bg1">
+                            <a:alpha val="35000"/>
+                          </a:schemeClr>
+                        </a:outerShdw>
+                      </a:effectLst>
                       <a:scene3d>
                         <a:camera prst="orthographicFront">
                           <a:rot lat="0" lon="21299999" rev="0"/>
@@ -4547,14 +4649,19 @@
                       <a:prstGeom prst="flowChartCollate">
                         <a:avLst/>
                       </a:prstGeom>
-                      <a:solidFill>
-                        <a:srgbClr val="FFFFFF"/>
-                      </a:solidFill>
+                      <a:grpFill/>
                       <a:ln>
                         <a:solidFill>
                           <a:schemeClr val="tx1"/>
                         </a:solidFill>
                       </a:ln>
+                      <a:effectLst>
+                        <a:outerShdw blurRad="40000" dist="23000" dir="5400000" rotWithShape="0">
+                          <a:schemeClr val="bg1">
+                            <a:alpha val="35000"/>
+                          </a:schemeClr>
+                        </a:outerShdw>
+                      </a:effectLst>
                       <a:scene3d>
                         <a:camera prst="orthographicFront">
                           <a:rot lat="0" lon="21299999" rev="0"/>
@@ -4604,14 +4711,19 @@
                       <a:prstGeom prst="flowChartCollate">
                         <a:avLst/>
                       </a:prstGeom>
-                      <a:solidFill>
-                        <a:srgbClr val="FFFFFF"/>
-                      </a:solidFill>
+                      <a:grpFill/>
                       <a:ln>
                         <a:solidFill>
                           <a:schemeClr val="tx1"/>
                         </a:solidFill>
                       </a:ln>
+                      <a:effectLst>
+                        <a:outerShdw blurRad="40000" dist="23000" dir="5400000" rotWithShape="0">
+                          <a:schemeClr val="bg1">
+                            <a:alpha val="35000"/>
+                          </a:schemeClr>
+                        </a:outerShdw>
+                      </a:effectLst>
                       <a:scene3d>
                         <a:camera prst="orthographicFront">
                           <a:rot lat="0" lon="21299999" rev="0"/>
@@ -4661,10 +4773,17 @@
                       <a:prstGeom prst="rect">
                         <a:avLst/>
                       </a:prstGeom>
-                      <a:noFill/>
+                      <a:grpFill/>
                       <a:ln>
                         <a:noFill/>
                       </a:ln>
+                      <a:effectLst>
+                        <a:outerShdw blurRad="40000" dist="23000" dir="5400000" rotWithShape="0">
+                          <a:schemeClr val="bg1">
+                            <a:alpha val="35000"/>
+                          </a:schemeClr>
+                        </a:outerShdw>
+                      </a:effectLst>
                     </p:spPr>
                     <p:style>
                       <a:lnRef idx="1">
@@ -4723,10 +4842,17 @@
                       <a:prstGeom prst="rect">
                         <a:avLst/>
                       </a:prstGeom>
-                      <a:noFill/>
+                      <a:grpFill/>
                       <a:ln>
                         <a:noFill/>
                       </a:ln>
+                      <a:effectLst>
+                        <a:outerShdw blurRad="40000" dist="23000" dir="5400000" rotWithShape="0">
+                          <a:schemeClr val="bg1">
+                            <a:alpha val="35000"/>
+                          </a:schemeClr>
+                        </a:outerShdw>
+                      </a:effectLst>
                     </p:spPr>
                     <p:style>
                       <a:lnRef idx="1">
@@ -4785,10 +4911,17 @@
                       <a:prstGeom prst="rect">
                         <a:avLst/>
                       </a:prstGeom>
-                      <a:noFill/>
+                      <a:grpFill/>
                       <a:ln>
                         <a:noFill/>
                       </a:ln>
+                      <a:effectLst>
+                        <a:outerShdw blurRad="40000" dist="23000" dir="5400000" rotWithShape="0">
+                          <a:schemeClr val="bg1">
+                            <a:alpha val="35000"/>
+                          </a:schemeClr>
+                        </a:outerShdw>
+                      </a:effectLst>
                     </p:spPr>
                     <p:style>
                       <a:lnRef idx="1">
@@ -4847,14 +4980,17 @@
                       <a:prstGeom prst="flowChartCollate">
                         <a:avLst/>
                       </a:prstGeom>
-                      <a:solidFill>
-                        <a:srgbClr val="FFFFFF"/>
-                      </a:solidFill>
+                      <a:grpFill/>
                       <a:ln>
                         <a:solidFill>
                           <a:schemeClr val="tx1"/>
                         </a:solidFill>
                       </a:ln>
+                      <a:effectLst>
+                        <a:outerShdw blurRad="40000" dist="50800" dir="5400000" rotWithShape="0">
+                          <a:schemeClr val="bg1"/>
+                        </a:outerShdw>
+                      </a:effectLst>
                       <a:scene3d>
                         <a:camera prst="orthographicFront">
                           <a:rot lat="0" lon="21299999" rev="0"/>
@@ -4904,10 +5040,17 @@
                       <a:prstGeom prst="rect">
                         <a:avLst/>
                       </a:prstGeom>
-                      <a:noFill/>
+                      <a:grpFill/>
                       <a:ln>
                         <a:noFill/>
                       </a:ln>
+                      <a:effectLst>
+                        <a:outerShdw blurRad="40000" dist="23000" dir="5400000" rotWithShape="0">
+                          <a:schemeClr val="bg1">
+                            <a:alpha val="35000"/>
+                          </a:schemeClr>
+                        </a:outerShdw>
+                      </a:effectLst>
                     </p:spPr>
                     <p:style>
                       <a:lnRef idx="1">
@@ -4966,12 +5109,17 @@
                       <a:prstGeom prst="rect">
                         <a:avLst/>
                       </a:prstGeom>
-                      <a:noFill/>
+                      <a:grpFill/>
                       <a:ln>
                         <a:solidFill>
                           <a:schemeClr val="tx1"/>
                         </a:solidFill>
                       </a:ln>
+                      <a:effectLst>
+                        <a:outerShdw blurRad="40000" dist="50800" dir="5400000" rotWithShape="0">
+                          <a:schemeClr val="bg1"/>
+                        </a:outerShdw>
+                      </a:effectLst>
                     </p:spPr>
                     <p:style>
                       <a:lnRef idx="1">
@@ -5040,12 +5188,18 @@
                       <a:prstGeom prst="straightConnector1">
                         <a:avLst/>
                       </a:prstGeom>
+                      <a:grpFill/>
                       <a:ln>
                         <a:solidFill>
                           <a:srgbClr val="000000"/>
                         </a:solidFill>
                         <a:tailEnd type="arrow"/>
                       </a:ln>
+                      <a:effectLst>
+                        <a:outerShdw blurRad="40000" dist="50800" dir="5400000" rotWithShape="0">
+                          <a:schemeClr val="bg1"/>
+                        </a:outerShdw>
+                      </a:effectLst>
                     </p:spPr>
                     <p:style>
                       <a:lnRef idx="2">
@@ -5081,12 +5235,20 @@
                         <a:gd name="adj1" fmla="val 2537"/>
                       </a:avLst>
                     </a:prstGeom>
+                    <a:grpFill/>
                     <a:ln>
                       <a:solidFill>
                         <a:srgbClr val="000000"/>
                       </a:solidFill>
                       <a:tailEnd type="arrow"/>
                     </a:ln>
+                    <a:effectLst>
+                      <a:outerShdw blurRad="40000" dist="20000" dir="5400000" rotWithShape="0">
+                        <a:schemeClr val="bg1">
+                          <a:alpha val="38000"/>
+                        </a:schemeClr>
+                      </a:outerShdw>
+                    </a:effectLst>
                   </p:spPr>
                   <p:style>
                     <a:lnRef idx="2">
@@ -5122,12 +5284,14 @@
                         <a:gd name="adj1" fmla="val 50000"/>
                       </a:avLst>
                     </a:prstGeom>
-                    <a:ln>
+                    <a:grpFill/>
+                    <a:ln cmpd="sng">
                       <a:solidFill>
-                        <a:srgbClr val="000000"/>
+                        <a:schemeClr val="tx1"/>
                       </a:solidFill>
                       <a:tailEnd type="arrow"/>
                     </a:ln>
+                    <a:effectLst/>
                   </p:spPr>
                   <p:style>
                     <a:lnRef idx="2">
@@ -5158,10 +5322,17 @@
                     <a:prstGeom prst="rect">
                       <a:avLst/>
                     </a:prstGeom>
-                    <a:noFill/>
+                    <a:grpFill/>
                     <a:ln>
                       <a:noFill/>
                     </a:ln>
+                    <a:effectLst>
+                      <a:outerShdw blurRad="40000" dist="23000" dir="5400000" rotWithShape="0">
+                        <a:schemeClr val="bg1">
+                          <a:alpha val="35000"/>
+                        </a:schemeClr>
+                      </a:outerShdw>
+                    </a:effectLst>
                   </p:spPr>
                   <p:style>
                     <a:lnRef idx="1">
@@ -5220,10 +5391,17 @@
                     <a:prstGeom prst="rect">
                       <a:avLst/>
                     </a:prstGeom>
-                    <a:noFill/>
+                    <a:grpFill/>
                     <a:ln>
                       <a:noFill/>
                     </a:ln>
+                    <a:effectLst>
+                      <a:outerShdw blurRad="40000" dist="23000" dir="5400000" rotWithShape="0">
+                        <a:schemeClr val="bg1">
+                          <a:alpha val="35000"/>
+                        </a:schemeClr>
+                      </a:outerShdw>
+                    </a:effectLst>
                   </p:spPr>
                   <p:style>
                     <a:lnRef idx="1">
@@ -5274,10 +5452,17 @@
                     <a:prstGeom prst="rect">
                       <a:avLst/>
                     </a:prstGeom>
-                    <a:noFill/>
+                    <a:grpFill/>
                     <a:ln>
                       <a:noFill/>
                     </a:ln>
+                    <a:effectLst>
+                      <a:outerShdw blurRad="40000" dist="23000" dir="5400000" rotWithShape="0">
+                        <a:schemeClr val="bg1">
+                          <a:alpha val="35000"/>
+                        </a:schemeClr>
+                      </a:outerShdw>
+                    </a:effectLst>
                   </p:spPr>
                   <p:style>
                     <a:lnRef idx="1">
@@ -5338,14 +5523,19 @@
                 <a:prstGeom prst="flowChartCollate">
                   <a:avLst/>
                 </a:prstGeom>
-                <a:solidFill>
-                  <a:srgbClr val="FFFFFF"/>
-                </a:solidFill>
+                <a:grpFill/>
                 <a:ln>
                   <a:solidFill>
                     <a:schemeClr val="tx1"/>
                   </a:solidFill>
                 </a:ln>
+                <a:effectLst>
+                  <a:outerShdw blurRad="40000" dist="23000" dir="5400000" rotWithShape="0">
+                    <a:schemeClr val="bg1">
+                      <a:alpha val="35000"/>
+                    </a:schemeClr>
+                  </a:outerShdw>
+                </a:effectLst>
                 <a:scene3d>
                   <a:camera prst="orthographicFront">
                     <a:rot lat="0" lon="21299999" rev="0"/>
@@ -5396,14 +5586,19 @@
               <a:prstGeom prst="flowChartCollate">
                 <a:avLst/>
               </a:prstGeom>
-              <a:solidFill>
-                <a:srgbClr val="FFFFFF"/>
-              </a:solidFill>
+              <a:grpFill/>
               <a:ln>
                 <a:solidFill>
                   <a:schemeClr val="tx1"/>
                 </a:solidFill>
               </a:ln>
+              <a:effectLst>
+                <a:outerShdw blurRad="40000" dist="23000" dir="5400000" rotWithShape="0">
+                  <a:schemeClr val="bg1">
+                    <a:alpha val="35000"/>
+                  </a:schemeClr>
+                </a:outerShdw>
+              </a:effectLst>
               <a:scene3d>
                 <a:camera prst="orthographicFront">
                   <a:rot lat="0" lon="21299999" rev="0"/>
@@ -5454,10 +5649,17 @@
             <a:prstGeom prst="rect">
               <a:avLst/>
             </a:prstGeom>
-            <a:noFill/>
+            <a:grpFill/>
             <a:ln>
               <a:noFill/>
             </a:ln>
+            <a:effectLst>
+              <a:outerShdw blurRad="40000" dist="23000" dir="5400000" rotWithShape="0">
+                <a:schemeClr val="bg1">
+                  <a:alpha val="35000"/>
+                </a:schemeClr>
+              </a:outerShdw>
+            </a:effectLst>
           </p:spPr>
           <p:style>
             <a:lnRef idx="1">

</xml_diff>

<commit_message>
Final changes for the BG 2018 manuscript publication
Final changes for the BG 2018 manuscript publication
</commit_message>
<xml_diff>
--- a/raw_data/Figure_1.pptx
+++ b/raw_data/Figure_1.pptx
@@ -214,7 +214,7 @@
           <a:p>
             <a:fld id="{DC23AF62-04DA-F745-A8B9-E35E5BE7FD13}" type="datetimeFigureOut">
               <a:rPr lang="en-US" smtClean="0"/>
-              <a:t>2/2/18</a:t>
+              <a:t>5/1/18</a:t>
             </a:fld>
             <a:endParaRPr lang="en-US"/>
           </a:p>
@@ -379,7 +379,7 @@
           <a:p>
             <a:fld id="{22A196E9-23DA-40C8-8729-A416F64D3FDA}" type="datetimeFigureOut">
               <a:rPr lang="en-AU" smtClean="0"/>
-              <a:t>2/02/2018</a:t>
+              <a:t>1/05/2018</a:t>
             </a:fld>
             <a:endParaRPr lang="en-AU"/>
           </a:p>
@@ -921,7 +921,7 @@
           <a:p>
             <a:fld id="{747BD9CF-C612-43A8-B934-5CF47C06606C}" type="datetimeFigureOut">
               <a:rPr lang="en-AU" smtClean="0"/>
-              <a:t>2/02/2018</a:t>
+              <a:t>1/05/2018</a:t>
             </a:fld>
             <a:endParaRPr lang="en-AU"/>
           </a:p>
@@ -1091,7 +1091,7 @@
           <a:p>
             <a:fld id="{747BD9CF-C612-43A8-B934-5CF47C06606C}" type="datetimeFigureOut">
               <a:rPr lang="en-AU" smtClean="0"/>
-              <a:t>2/02/2018</a:t>
+              <a:t>1/05/2018</a:t>
             </a:fld>
             <a:endParaRPr lang="en-AU"/>
           </a:p>
@@ -1271,7 +1271,7 @@
           <a:p>
             <a:fld id="{747BD9CF-C612-43A8-B934-5CF47C06606C}" type="datetimeFigureOut">
               <a:rPr lang="en-AU" smtClean="0"/>
-              <a:t>2/02/2018</a:t>
+              <a:t>1/05/2018</a:t>
             </a:fld>
             <a:endParaRPr lang="en-AU"/>
           </a:p>
@@ -1441,7 +1441,7 @@
           <a:p>
             <a:fld id="{747BD9CF-C612-43A8-B934-5CF47C06606C}" type="datetimeFigureOut">
               <a:rPr lang="en-AU" smtClean="0"/>
-              <a:t>2/02/2018</a:t>
+              <a:t>1/05/2018</a:t>
             </a:fld>
             <a:endParaRPr lang="en-AU"/>
           </a:p>
@@ -1687,7 +1687,7 @@
           <a:p>
             <a:fld id="{747BD9CF-C612-43A8-B934-5CF47C06606C}" type="datetimeFigureOut">
               <a:rPr lang="en-AU" smtClean="0"/>
-              <a:t>2/02/2018</a:t>
+              <a:t>1/05/2018</a:t>
             </a:fld>
             <a:endParaRPr lang="en-AU"/>
           </a:p>
@@ -1975,7 +1975,7 @@
           <a:p>
             <a:fld id="{747BD9CF-C612-43A8-B934-5CF47C06606C}" type="datetimeFigureOut">
               <a:rPr lang="en-AU" smtClean="0"/>
-              <a:t>2/02/2018</a:t>
+              <a:t>1/05/2018</a:t>
             </a:fld>
             <a:endParaRPr lang="en-AU"/>
           </a:p>
@@ -2397,7 +2397,7 @@
           <a:p>
             <a:fld id="{747BD9CF-C612-43A8-B934-5CF47C06606C}" type="datetimeFigureOut">
               <a:rPr lang="en-AU" smtClean="0"/>
-              <a:t>2/02/2018</a:t>
+              <a:t>1/05/2018</a:t>
             </a:fld>
             <a:endParaRPr lang="en-AU"/>
           </a:p>
@@ -2515,7 +2515,7 @@
           <a:p>
             <a:fld id="{747BD9CF-C612-43A8-B934-5CF47C06606C}" type="datetimeFigureOut">
               <a:rPr lang="en-AU" smtClean="0"/>
-              <a:t>2/02/2018</a:t>
+              <a:t>1/05/2018</a:t>
             </a:fld>
             <a:endParaRPr lang="en-AU"/>
           </a:p>
@@ -2610,7 +2610,7 @@
           <a:p>
             <a:fld id="{747BD9CF-C612-43A8-B934-5CF47C06606C}" type="datetimeFigureOut">
               <a:rPr lang="en-AU" smtClean="0"/>
-              <a:t>2/02/2018</a:t>
+              <a:t>1/05/2018</a:t>
             </a:fld>
             <a:endParaRPr lang="en-AU"/>
           </a:p>
@@ -2887,7 +2887,7 @@
           <a:p>
             <a:fld id="{747BD9CF-C612-43A8-B934-5CF47C06606C}" type="datetimeFigureOut">
               <a:rPr lang="en-AU" smtClean="0"/>
-              <a:t>2/02/2018</a:t>
+              <a:t>1/05/2018</a:t>
             </a:fld>
             <a:endParaRPr lang="en-AU"/>
           </a:p>
@@ -3140,7 +3140,7 @@
           <a:p>
             <a:fld id="{747BD9CF-C612-43A8-B934-5CF47C06606C}" type="datetimeFigureOut">
               <a:rPr lang="en-AU" smtClean="0"/>
-              <a:t>2/02/2018</a:t>
+              <a:t>1/05/2018</a:t>
             </a:fld>
             <a:endParaRPr lang="en-AU"/>
           </a:p>
@@ -3353,7 +3353,7 @@
           <a:p>
             <a:fld id="{747BD9CF-C612-43A8-B934-5CF47C06606C}" type="datetimeFigureOut">
               <a:rPr lang="en-AU" smtClean="0"/>
-              <a:t>2/02/2018</a:t>
+              <a:t>1/05/2018</a:t>
             </a:fld>
             <a:endParaRPr lang="en-AU"/>
           </a:p>
@@ -3736,10 +3736,10 @@
         </p:nvGrpSpPr>
         <p:grpSpPr>
           <a:xfrm>
-            <a:off x="2502024" y="1312906"/>
-            <a:ext cx="3600397" cy="1657777"/>
-            <a:chOff x="2449958" y="1312907"/>
-            <a:chExt cx="3124986" cy="2021396"/>
+            <a:off x="2839812" y="1312907"/>
+            <a:ext cx="3262616" cy="1657777"/>
+            <a:chOff x="2743144" y="1312908"/>
+            <a:chExt cx="2831807" cy="2021396"/>
           </a:xfrm>
           <a:noFill/>
           <a:effectLst>
@@ -3758,10 +3758,10 @@
           </p:nvGrpSpPr>
           <p:grpSpPr>
             <a:xfrm>
-              <a:off x="2602298" y="1312907"/>
-              <a:ext cx="2972646" cy="2021396"/>
-              <a:chOff x="5268032" y="778358"/>
-              <a:chExt cx="2972636" cy="2021396"/>
+              <a:off x="3026694" y="1312908"/>
+              <a:ext cx="2548257" cy="2021396"/>
+              <a:chOff x="5692423" y="778359"/>
+              <a:chExt cx="2548247" cy="2021396"/>
             </a:xfrm>
             <a:grpFill/>
             <a:effectLst/>
@@ -3774,10 +3774,10 @@
             </p:nvGrpSpPr>
             <p:grpSpPr>
               <a:xfrm>
-                <a:off x="5268032" y="778358"/>
-                <a:ext cx="2972636" cy="2021396"/>
-                <a:chOff x="5268032" y="778358"/>
-                <a:chExt cx="2972636" cy="2021396"/>
+                <a:off x="5692423" y="778359"/>
+                <a:ext cx="2548247" cy="2021396"/>
+                <a:chOff x="5692423" y="778359"/>
+                <a:chExt cx="2548247" cy="2021396"/>
               </a:xfrm>
               <a:grpFill/>
             </p:grpSpPr>
@@ -3789,10 +3789,10 @@
               </p:nvGrpSpPr>
               <p:grpSpPr>
                 <a:xfrm>
-                  <a:off x="5268032" y="778358"/>
-                  <a:ext cx="2972636" cy="2021396"/>
-                  <a:chOff x="5141859" y="1012547"/>
-                  <a:chExt cx="4002141" cy="2609593"/>
+                  <a:off x="5692423" y="778359"/>
+                  <a:ext cx="2548247" cy="2021396"/>
+                  <a:chOff x="5713227" y="1012547"/>
+                  <a:chExt cx="3430773" cy="2609593"/>
                 </a:xfrm>
                 <a:grpFill/>
               </p:grpSpPr>
@@ -3804,10 +3804,10 @@
                 </p:nvGrpSpPr>
                 <p:grpSpPr>
                   <a:xfrm>
-                    <a:off x="5328404" y="1588024"/>
-                    <a:ext cx="1406265" cy="507978"/>
-                    <a:chOff x="3995920" y="3723878"/>
-                    <a:chExt cx="1778512" cy="557922"/>
+                    <a:off x="5713227" y="1588024"/>
+                    <a:ext cx="1021440" cy="507978"/>
+                    <a:chOff x="4482610" y="3723878"/>
+                    <a:chExt cx="1291822" cy="557922"/>
                   </a:xfrm>
                   <a:grpFill/>
                 </p:grpSpPr>
@@ -3880,15 +3880,13 @@
                 <p:cxnSp>
                   <p:nvCxnSpPr>
                     <p:cNvPr id="176" name="Straight Arrow Connector 175"/>
-                    <p:cNvCxnSpPr>
-                      <a:endCxn id="175" idx="1"/>
-                    </p:cNvCxnSpPr>
+                    <p:cNvCxnSpPr/>
                     <p:nvPr/>
                   </p:nvCxnSpPr>
                   <p:spPr>
                     <a:xfrm>
-                      <a:off x="3995920" y="4037062"/>
-                      <a:ext cx="961271" cy="0"/>
+                      <a:off x="4482610" y="4037062"/>
+                      <a:ext cx="483668" cy="0"/>
                     </a:xfrm>
                     <a:prstGeom prst="straightConnector1">
                       <a:avLst/>
@@ -4055,10 +4053,10 @@
                 </p:nvGrpSpPr>
                 <p:grpSpPr>
                   <a:xfrm>
-                    <a:off x="5141859" y="1068519"/>
-                    <a:ext cx="720489" cy="804876"/>
-                    <a:chOff x="1222136" y="1569122"/>
-                    <a:chExt cx="911209" cy="884011"/>
+                    <a:off x="5778208" y="1015055"/>
+                    <a:ext cx="676970" cy="704091"/>
+                    <a:chOff x="2026929" y="1510402"/>
+                    <a:chExt cx="856169" cy="773317"/>
                   </a:xfrm>
                   <a:grpFill/>
                 </p:grpSpPr>
@@ -4070,8 +4068,8 @@
                   </p:nvCxnSpPr>
                   <p:spPr>
                     <a:xfrm flipV="1">
-                      <a:off x="1880136" y="1687459"/>
-                      <a:ext cx="10851" cy="765674"/>
+                      <a:off x="2629890" y="1518046"/>
+                      <a:ext cx="10851" cy="765673"/>
                     </a:xfrm>
                     <a:prstGeom prst="straightConnector1">
                       <a:avLst/>
@@ -4114,8 +4112,8 @@
                   </p:nvSpPr>
                   <p:spPr>
                     <a:xfrm>
-                      <a:off x="1222136" y="1569122"/>
-                      <a:ext cx="737048" cy="338336"/>
+                      <a:off x="2026929" y="1510402"/>
+                      <a:ext cx="737047" cy="338338"/>
                     </a:xfrm>
                     <a:prstGeom prst="rect">
                       <a:avLst/>
@@ -4183,7 +4181,7 @@
                   </p:nvSpPr>
                   <p:spPr>
                     <a:xfrm rot="5400000">
-                      <a:off x="1832737" y="1924007"/>
+                      <a:off x="2582490" y="1754594"/>
                       <a:ext cx="97160" cy="504057"/>
                     </a:xfrm>
                     <a:prstGeom prst="flowChartCollate">
@@ -5643,7 +5641,7 @@
           </p:nvSpPr>
           <p:spPr>
             <a:xfrm>
-              <a:off x="2449958" y="1860242"/>
+              <a:off x="2743144" y="1860242"/>
               <a:ext cx="394312" cy="238615"/>
             </a:xfrm>
             <a:prstGeom prst="rect">

</xml_diff>